<commit_message>
build the adjacency matrix for US county
</commit_message>
<xml_diff>
--- a/Paper writing/graphs.pptx
+++ b/Paper writing/graphs.pptx
@@ -104,6 +104,11 @@
       </a:defRPr>
     </a:lvl9pPr>
   </p:defaultTextStyle>
+  <p:extLst>
+    <p:ext uri="{EFAFB233-063F-42B5-8137-9DF3F51BA10A}">
+      <p15:sldGuideLst xmlns:p15="http://schemas.microsoft.com/office/powerpoint/2012/main"/>
+    </p:ext>
+  </p:extLst>
 </p:presentation>
 </file>
 
@@ -3323,10 +3328,10 @@
       </p:grpSpPr>
       <p:grpSp>
         <p:nvGrpSpPr>
-          <p:cNvPr id="63" name="Group 62">
-            <a:extLst>
-              <a:ext uri="{FF2B5EF4-FFF2-40B4-BE49-F238E27FC236}">
-                <a16:creationId xmlns:a16="http://schemas.microsoft.com/office/drawing/2014/main" id="{5BC4E1B1-6D80-477B-BF23-62976FC96DEB}"/>
+          <p:cNvPr id="8" name="Group 7">
+            <a:extLst>
+              <a:ext uri="{FF2B5EF4-FFF2-40B4-BE49-F238E27FC236}">
+                <a16:creationId xmlns:a16="http://schemas.microsoft.com/office/drawing/2014/main" id="{3AE87EB2-2DE5-414A-B94B-E02188F680DF}"/>
               </a:ext>
             </a:extLst>
           </p:cNvPr>
@@ -3335,18 +3340,1130 @@
         </p:nvGrpSpPr>
         <p:grpSpPr>
           <a:xfrm>
-            <a:off x="1586210" y="709131"/>
-            <a:ext cx="9321276" cy="5505058"/>
-            <a:chOff x="1586210" y="709131"/>
-            <a:chExt cx="9321276" cy="5505058"/>
+            <a:off x="105746" y="709131"/>
+            <a:ext cx="12278933" cy="5505058"/>
+            <a:chOff x="105746" y="709131"/>
+            <a:chExt cx="12278933" cy="5505058"/>
           </a:xfrm>
         </p:grpSpPr>
+        <p:grpSp>
+          <p:nvGrpSpPr>
+            <p:cNvPr id="63" name="Group 62">
+              <a:extLst>
+                <a:ext uri="{FF2B5EF4-FFF2-40B4-BE49-F238E27FC236}">
+                  <a16:creationId xmlns:a16="http://schemas.microsoft.com/office/drawing/2014/main" id="{5BC4E1B1-6D80-477B-BF23-62976FC96DEB}"/>
+                </a:ext>
+              </a:extLst>
+            </p:cNvPr>
+            <p:cNvGrpSpPr/>
+            <p:nvPr/>
+          </p:nvGrpSpPr>
+          <p:grpSpPr>
+            <a:xfrm>
+              <a:off x="1586210" y="709131"/>
+              <a:ext cx="9321276" cy="5505058"/>
+              <a:chOff x="1586210" y="709131"/>
+              <a:chExt cx="9321276" cy="5505058"/>
+            </a:xfrm>
+          </p:grpSpPr>
+          <p:sp>
+            <p:nvSpPr>
+              <p:cNvPr id="5" name="Rectangle 4">
+                <a:extLst>
+                  <a:ext uri="{FF2B5EF4-FFF2-40B4-BE49-F238E27FC236}">
+                    <a16:creationId xmlns:a16="http://schemas.microsoft.com/office/drawing/2014/main" id="{986FAA45-2516-48CC-AB3A-8206B88358CB}"/>
+                  </a:ext>
+                </a:extLst>
+              </p:cNvPr>
+              <p:cNvSpPr/>
+              <p:nvPr/>
+            </p:nvSpPr>
+            <p:spPr>
+              <a:xfrm>
+                <a:off x="1934547" y="3359021"/>
+                <a:ext cx="1828800" cy="951722"/>
+              </a:xfrm>
+              <a:prstGeom prst="rect">
+                <a:avLst/>
+              </a:prstGeom>
+              <a:noFill/>
+            </p:spPr>
+            <p:style>
+              <a:lnRef idx="2">
+                <a:schemeClr val="accent1">
+                  <a:shade val="50000"/>
+                </a:schemeClr>
+              </a:lnRef>
+              <a:fillRef idx="1">
+                <a:schemeClr val="accent1"/>
+              </a:fillRef>
+              <a:effectRef idx="0">
+                <a:schemeClr val="accent1"/>
+              </a:effectRef>
+              <a:fontRef idx="minor">
+                <a:schemeClr val="lt1"/>
+              </a:fontRef>
+            </p:style>
+            <p:txBody>
+              <a:bodyPr rtlCol="0" anchor="ctr"/>
+              <a:lstStyle/>
+              <a:p>
+                <a:pPr algn="ctr"/>
+                <a:r>
+                  <a:rPr lang="en-US" dirty="0">
+                    <a:solidFill>
+                      <a:schemeClr val="tx1"/>
+                    </a:solidFill>
+                  </a:rPr>
+                  <a:t>Map element detection</a:t>
+                </a:r>
+              </a:p>
+            </p:txBody>
+          </p:sp>
+          <p:sp>
+            <p:nvSpPr>
+              <p:cNvPr id="7" name="Rectangle 6">
+                <a:extLst>
+                  <a:ext uri="{FF2B5EF4-FFF2-40B4-BE49-F238E27FC236}">
+                    <a16:creationId xmlns:a16="http://schemas.microsoft.com/office/drawing/2014/main" id="{5B5C2C04-508F-4E94-9CF8-98514A8FF68A}"/>
+                  </a:ext>
+                </a:extLst>
+              </p:cNvPr>
+              <p:cNvSpPr/>
+              <p:nvPr/>
+            </p:nvSpPr>
+            <p:spPr>
+              <a:xfrm>
+                <a:off x="4136571" y="2192695"/>
+                <a:ext cx="1828800" cy="951722"/>
+              </a:xfrm>
+              <a:prstGeom prst="rect">
+                <a:avLst/>
+              </a:prstGeom>
+              <a:noFill/>
+            </p:spPr>
+            <p:style>
+              <a:lnRef idx="2">
+                <a:schemeClr val="accent1">
+                  <a:shade val="50000"/>
+                </a:schemeClr>
+              </a:lnRef>
+              <a:fillRef idx="1">
+                <a:schemeClr val="accent1"/>
+              </a:fillRef>
+              <a:effectRef idx="0">
+                <a:schemeClr val="accent1"/>
+              </a:effectRef>
+              <a:fontRef idx="minor">
+                <a:schemeClr val="lt1"/>
+              </a:fontRef>
+            </p:style>
+            <p:txBody>
+              <a:bodyPr rtlCol="0" anchor="ctr"/>
+              <a:lstStyle/>
+              <a:p>
+                <a:pPr algn="ctr"/>
+                <a:r>
+                  <a:rPr lang="en-US" dirty="0">
+                    <a:solidFill>
+                      <a:schemeClr val="tx1"/>
+                    </a:solidFill>
+                  </a:rPr>
+                  <a:t>Text recognition</a:t>
+                </a:r>
+              </a:p>
+              <a:p>
+                <a:pPr algn="ctr"/>
+                <a:r>
+                  <a:rPr lang="en-US" dirty="0">
+                    <a:solidFill>
+                      <a:schemeClr val="tx1"/>
+                    </a:solidFill>
+                  </a:rPr>
+                  <a:t>(OCR)</a:t>
+                </a:r>
+              </a:p>
+            </p:txBody>
+          </p:sp>
+          <p:sp>
+            <p:nvSpPr>
+              <p:cNvPr id="9" name="Rectangle 8">
+                <a:extLst>
+                  <a:ext uri="{FF2B5EF4-FFF2-40B4-BE49-F238E27FC236}">
+                    <a16:creationId xmlns:a16="http://schemas.microsoft.com/office/drawing/2014/main" id="{DDAD67B1-0797-464C-91E0-5942D6FB5B58}"/>
+                  </a:ext>
+                </a:extLst>
+              </p:cNvPr>
+              <p:cNvSpPr/>
+              <p:nvPr/>
+            </p:nvSpPr>
+            <p:spPr>
+              <a:xfrm>
+                <a:off x="6341706" y="2192695"/>
+                <a:ext cx="1828800" cy="951722"/>
+              </a:xfrm>
+              <a:prstGeom prst="rect">
+                <a:avLst/>
+              </a:prstGeom>
+              <a:noFill/>
+            </p:spPr>
+            <p:style>
+              <a:lnRef idx="2">
+                <a:schemeClr val="accent1">
+                  <a:shade val="50000"/>
+                </a:schemeClr>
+              </a:lnRef>
+              <a:fillRef idx="1">
+                <a:schemeClr val="accent1"/>
+              </a:fillRef>
+              <a:effectRef idx="0">
+                <a:schemeClr val="accent1"/>
+              </a:effectRef>
+              <a:fontRef idx="minor">
+                <a:schemeClr val="lt1"/>
+              </a:fontRef>
+            </p:style>
+            <p:txBody>
+              <a:bodyPr rtlCol="0" anchor="ctr"/>
+              <a:lstStyle/>
+              <a:p>
+                <a:pPr algn="ctr"/>
+                <a:r>
+                  <a:rPr lang="en-US" dirty="0">
+                    <a:solidFill>
+                      <a:schemeClr val="tx1"/>
+                    </a:solidFill>
+                  </a:rPr>
+                  <a:t>Extract topic et al</a:t>
+                </a:r>
+              </a:p>
+              <a:p>
+                <a:pPr algn="ctr"/>
+                <a:r>
+                  <a:rPr lang="en-US" dirty="0">
+                    <a:solidFill>
+                      <a:schemeClr val="tx1"/>
+                    </a:solidFill>
+                  </a:rPr>
+                  <a:t>(NER)</a:t>
+                </a:r>
+              </a:p>
+            </p:txBody>
+          </p:sp>
+          <p:sp>
+            <p:nvSpPr>
+              <p:cNvPr id="11" name="Rectangle 10">
+                <a:extLst>
+                  <a:ext uri="{FF2B5EF4-FFF2-40B4-BE49-F238E27FC236}">
+                    <a16:creationId xmlns:a16="http://schemas.microsoft.com/office/drawing/2014/main" id="{A8D043ED-9D83-44A7-B68E-DC0D9E8D63D6}"/>
+                  </a:ext>
+                </a:extLst>
+              </p:cNvPr>
+              <p:cNvSpPr/>
+              <p:nvPr/>
+            </p:nvSpPr>
+            <p:spPr>
+              <a:xfrm>
+                <a:off x="4136571" y="3359021"/>
+                <a:ext cx="1828800" cy="951722"/>
+              </a:xfrm>
+              <a:prstGeom prst="rect">
+                <a:avLst/>
+              </a:prstGeom>
+              <a:noFill/>
+            </p:spPr>
+            <p:style>
+              <a:lnRef idx="2">
+                <a:schemeClr val="accent1">
+                  <a:shade val="50000"/>
+                </a:schemeClr>
+              </a:lnRef>
+              <a:fillRef idx="1">
+                <a:schemeClr val="accent1"/>
+              </a:fillRef>
+              <a:effectRef idx="0">
+                <a:schemeClr val="accent1"/>
+              </a:effectRef>
+              <a:fontRef idx="minor">
+                <a:schemeClr val="lt1"/>
+              </a:fontRef>
+            </p:style>
+            <p:txBody>
+              <a:bodyPr rtlCol="0" anchor="ctr"/>
+              <a:lstStyle/>
+              <a:p>
+                <a:pPr algn="ctr"/>
+                <a:r>
+                  <a:rPr lang="en-US" altLang="zh-CN" dirty="0">
+                    <a:solidFill>
+                      <a:schemeClr val="tx1"/>
+                    </a:solidFill>
+                  </a:rPr>
+                  <a:t>Legend analysis</a:t>
+                </a:r>
+                <a:endParaRPr lang="en-US" dirty="0">
+                  <a:solidFill>
+                    <a:schemeClr val="tx1"/>
+                  </a:solidFill>
+                </a:endParaRPr>
+              </a:p>
+            </p:txBody>
+          </p:sp>
+          <p:sp>
+            <p:nvSpPr>
+              <p:cNvPr id="13" name="Rectangle 12">
+                <a:extLst>
+                  <a:ext uri="{FF2B5EF4-FFF2-40B4-BE49-F238E27FC236}">
+                    <a16:creationId xmlns:a16="http://schemas.microsoft.com/office/drawing/2014/main" id="{65A8F675-8318-4A5A-AE81-8287B5462CD5}"/>
+                  </a:ext>
+                </a:extLst>
+              </p:cNvPr>
+              <p:cNvSpPr/>
+              <p:nvPr/>
+            </p:nvSpPr>
+            <p:spPr>
+              <a:xfrm>
+                <a:off x="4141236" y="4525347"/>
+                <a:ext cx="1828800" cy="951722"/>
+              </a:xfrm>
+              <a:prstGeom prst="rect">
+                <a:avLst/>
+              </a:prstGeom>
+              <a:noFill/>
+            </p:spPr>
+            <p:style>
+              <a:lnRef idx="2">
+                <a:schemeClr val="accent1">
+                  <a:shade val="50000"/>
+                </a:schemeClr>
+              </a:lnRef>
+              <a:fillRef idx="1">
+                <a:schemeClr val="accent1"/>
+              </a:fillRef>
+              <a:effectRef idx="0">
+                <a:schemeClr val="accent1"/>
+              </a:effectRef>
+              <a:fontRef idx="minor">
+                <a:schemeClr val="lt1"/>
+              </a:fontRef>
+            </p:style>
+            <p:txBody>
+              <a:bodyPr rtlCol="0" anchor="ctr"/>
+              <a:lstStyle/>
+              <a:p>
+                <a:pPr algn="ctr"/>
+                <a:r>
+                  <a:rPr lang="en-US" dirty="0">
+                    <a:solidFill>
+                      <a:schemeClr val="tx1"/>
+                    </a:solidFill>
+                  </a:rPr>
+                  <a:t>State detection</a:t>
+                </a:r>
+              </a:p>
+              <a:p>
+                <a:pPr algn="ctr"/>
+                <a:r>
+                  <a:rPr lang="en-US" dirty="0">
+                    <a:solidFill>
+                      <a:schemeClr val="tx1"/>
+                    </a:solidFill>
+                  </a:rPr>
+                  <a:t>(template matching)</a:t>
+                </a:r>
+              </a:p>
+            </p:txBody>
+          </p:sp>
+          <p:sp>
+            <p:nvSpPr>
+              <p:cNvPr id="15" name="Rectangle 14">
+                <a:extLst>
+                  <a:ext uri="{FF2B5EF4-FFF2-40B4-BE49-F238E27FC236}">
+                    <a16:creationId xmlns:a16="http://schemas.microsoft.com/office/drawing/2014/main" id="{722C8BAA-BB08-4EE3-AA48-323FF8249C54}"/>
+                  </a:ext>
+                </a:extLst>
+              </p:cNvPr>
+              <p:cNvSpPr/>
+              <p:nvPr/>
+            </p:nvSpPr>
+            <p:spPr>
+              <a:xfrm>
+                <a:off x="8546841" y="3359021"/>
+                <a:ext cx="1828800" cy="951722"/>
+              </a:xfrm>
+              <a:prstGeom prst="rect">
+                <a:avLst/>
+              </a:prstGeom>
+              <a:noFill/>
+            </p:spPr>
+            <p:style>
+              <a:lnRef idx="2">
+                <a:schemeClr val="accent1">
+                  <a:shade val="50000"/>
+                </a:schemeClr>
+              </a:lnRef>
+              <a:fillRef idx="1">
+                <a:schemeClr val="accent1"/>
+              </a:fillRef>
+              <a:effectRef idx="0">
+                <a:schemeClr val="accent1"/>
+              </a:effectRef>
+              <a:fontRef idx="minor">
+                <a:schemeClr val="lt1"/>
+              </a:fontRef>
+            </p:style>
+            <p:txBody>
+              <a:bodyPr rtlCol="0" anchor="ctr"/>
+              <a:lstStyle/>
+              <a:p>
+                <a:pPr algn="ctr"/>
+                <a:r>
+                  <a:rPr lang="en-US" dirty="0">
+                    <a:solidFill>
+                      <a:schemeClr val="tx1"/>
+                    </a:solidFill>
+                  </a:rPr>
+                  <a:t>Spatial relation analysis</a:t>
+                </a:r>
+              </a:p>
+            </p:txBody>
+          </p:sp>
+          <p:sp>
+            <p:nvSpPr>
+              <p:cNvPr id="18" name="Rectangle: Single Corner Snipped 17">
+                <a:extLst>
+                  <a:ext uri="{FF2B5EF4-FFF2-40B4-BE49-F238E27FC236}">
+                    <a16:creationId xmlns:a16="http://schemas.microsoft.com/office/drawing/2014/main" id="{689CB3BA-FE81-418F-8A5D-B3D9E4E1F24E}"/>
+                  </a:ext>
+                </a:extLst>
+              </p:cNvPr>
+              <p:cNvSpPr/>
+              <p:nvPr/>
+            </p:nvSpPr>
+            <p:spPr>
+              <a:xfrm>
+                <a:off x="2133470" y="1800805"/>
+                <a:ext cx="1412032" cy="569167"/>
+              </a:xfrm>
+              <a:prstGeom prst="snip1Rect">
+                <a:avLst/>
+              </a:prstGeom>
+              <a:noFill/>
+            </p:spPr>
+            <p:style>
+              <a:lnRef idx="2">
+                <a:schemeClr val="accent1">
+                  <a:shade val="50000"/>
+                </a:schemeClr>
+              </a:lnRef>
+              <a:fillRef idx="1">
+                <a:schemeClr val="accent1"/>
+              </a:fillRef>
+              <a:effectRef idx="0">
+                <a:schemeClr val="accent1"/>
+              </a:effectRef>
+              <a:fontRef idx="minor">
+                <a:schemeClr val="lt1"/>
+              </a:fontRef>
+            </p:style>
+            <p:txBody>
+              <a:bodyPr rtlCol="0" anchor="ctr"/>
+              <a:lstStyle/>
+              <a:p>
+                <a:pPr algn="ctr"/>
+                <a:r>
+                  <a:rPr lang="en-US" dirty="0">
+                    <a:solidFill>
+                      <a:schemeClr val="tx1"/>
+                    </a:solidFill>
+                  </a:rPr>
+                  <a:t>Choropleth map images</a:t>
+                </a:r>
+              </a:p>
+            </p:txBody>
+          </p:sp>
+          <p:sp>
+            <p:nvSpPr>
+              <p:cNvPr id="20" name="Rectangle: Single Corner Snipped 19">
+                <a:extLst>
+                  <a:ext uri="{FF2B5EF4-FFF2-40B4-BE49-F238E27FC236}">
+                    <a16:creationId xmlns:a16="http://schemas.microsoft.com/office/drawing/2014/main" id="{357F4308-64AC-4177-AA58-2E35A4C39C51}"/>
+                  </a:ext>
+                </a:extLst>
+              </p:cNvPr>
+              <p:cNvSpPr/>
+              <p:nvPr/>
+            </p:nvSpPr>
+            <p:spPr>
+              <a:xfrm>
+                <a:off x="8755225" y="1800805"/>
+                <a:ext cx="1412032" cy="569167"/>
+              </a:xfrm>
+              <a:prstGeom prst="snip1Rect">
+                <a:avLst/>
+              </a:prstGeom>
+              <a:noFill/>
+            </p:spPr>
+            <p:style>
+              <a:lnRef idx="2">
+                <a:schemeClr val="accent1">
+                  <a:shade val="50000"/>
+                </a:schemeClr>
+              </a:lnRef>
+              <a:fillRef idx="1">
+                <a:schemeClr val="accent1"/>
+              </a:fillRef>
+              <a:effectRef idx="0">
+                <a:schemeClr val="accent1"/>
+              </a:effectRef>
+              <a:fontRef idx="minor">
+                <a:schemeClr val="lt1"/>
+              </a:fontRef>
+            </p:style>
+            <p:txBody>
+              <a:bodyPr rtlCol="0" anchor="ctr"/>
+              <a:lstStyle/>
+              <a:p>
+                <a:pPr algn="ctr"/>
+                <a:r>
+                  <a:rPr lang="en-US" dirty="0">
+                    <a:solidFill>
+                      <a:schemeClr val="tx1"/>
+                    </a:solidFill>
+                  </a:rPr>
+                  <a:t>Shapefile of the US</a:t>
+                </a:r>
+              </a:p>
+            </p:txBody>
+          </p:sp>
+          <p:cxnSp>
+            <p:nvCxnSpPr>
+              <p:cNvPr id="28" name="Connector: Elbow 27">
+                <a:extLst>
+                  <a:ext uri="{FF2B5EF4-FFF2-40B4-BE49-F238E27FC236}">
+                    <a16:creationId xmlns:a16="http://schemas.microsoft.com/office/drawing/2014/main" id="{BFBBFF43-9F1A-4604-A328-3D84E2C4F2F6}"/>
+                  </a:ext>
+                </a:extLst>
+              </p:cNvPr>
+              <p:cNvCxnSpPr>
+                <a:stCxn id="5" idx="3"/>
+                <a:endCxn id="7" idx="1"/>
+              </p:cNvCxnSpPr>
+              <p:nvPr/>
+            </p:nvCxnSpPr>
+            <p:spPr>
+              <a:xfrm flipV="1">
+                <a:off x="3763347" y="2668556"/>
+                <a:ext cx="373224" cy="1166326"/>
+              </a:xfrm>
+              <a:prstGeom prst="bentConnector3">
+                <a:avLst/>
+              </a:prstGeom>
+              <a:ln>
+                <a:tailEnd type="triangle"/>
+              </a:ln>
+            </p:spPr>
+            <p:style>
+              <a:lnRef idx="1">
+                <a:schemeClr val="accent1"/>
+              </a:lnRef>
+              <a:fillRef idx="0">
+                <a:schemeClr val="accent1"/>
+              </a:fillRef>
+              <a:effectRef idx="0">
+                <a:schemeClr val="accent1"/>
+              </a:effectRef>
+              <a:fontRef idx="minor">
+                <a:schemeClr val="tx1"/>
+              </a:fontRef>
+            </p:style>
+          </p:cxnSp>
+          <p:cxnSp>
+            <p:nvCxnSpPr>
+              <p:cNvPr id="33" name="Straight Arrow Connector 32">
+                <a:extLst>
+                  <a:ext uri="{FF2B5EF4-FFF2-40B4-BE49-F238E27FC236}">
+                    <a16:creationId xmlns:a16="http://schemas.microsoft.com/office/drawing/2014/main" id="{8383D4A2-72FE-465B-8A66-30E46FA740C0}"/>
+                  </a:ext>
+                </a:extLst>
+              </p:cNvPr>
+              <p:cNvCxnSpPr>
+                <a:stCxn id="18" idx="1"/>
+                <a:endCxn id="5" idx="0"/>
+              </p:cNvCxnSpPr>
+              <p:nvPr/>
+            </p:nvCxnSpPr>
+            <p:spPr>
+              <a:xfrm>
+                <a:off x="2839486" y="2369972"/>
+                <a:ext cx="9461" cy="989049"/>
+              </a:xfrm>
+              <a:prstGeom prst="straightConnector1">
+                <a:avLst/>
+              </a:prstGeom>
+              <a:ln>
+                <a:tailEnd type="triangle"/>
+              </a:ln>
+            </p:spPr>
+            <p:style>
+              <a:lnRef idx="1">
+                <a:schemeClr val="accent1"/>
+              </a:lnRef>
+              <a:fillRef idx="0">
+                <a:schemeClr val="accent1"/>
+              </a:fillRef>
+              <a:effectRef idx="0">
+                <a:schemeClr val="accent1"/>
+              </a:effectRef>
+              <a:fontRef idx="minor">
+                <a:schemeClr val="tx1"/>
+              </a:fontRef>
+            </p:style>
+          </p:cxnSp>
+          <p:cxnSp>
+            <p:nvCxnSpPr>
+              <p:cNvPr id="35" name="Straight Arrow Connector 34">
+                <a:extLst>
+                  <a:ext uri="{FF2B5EF4-FFF2-40B4-BE49-F238E27FC236}">
+                    <a16:creationId xmlns:a16="http://schemas.microsoft.com/office/drawing/2014/main" id="{A32474B1-E44F-4B7B-B3ED-88180239E526}"/>
+                  </a:ext>
+                </a:extLst>
+              </p:cNvPr>
+              <p:cNvCxnSpPr>
+                <a:stCxn id="20" idx="1"/>
+                <a:endCxn id="15" idx="0"/>
+              </p:cNvCxnSpPr>
+              <p:nvPr/>
+            </p:nvCxnSpPr>
+            <p:spPr>
+              <a:xfrm>
+                <a:off x="9461241" y="2369972"/>
+                <a:ext cx="0" cy="989049"/>
+              </a:xfrm>
+              <a:prstGeom prst="straightConnector1">
+                <a:avLst/>
+              </a:prstGeom>
+              <a:ln>
+                <a:tailEnd type="triangle"/>
+              </a:ln>
+            </p:spPr>
+            <p:style>
+              <a:lnRef idx="1">
+                <a:schemeClr val="accent1"/>
+              </a:lnRef>
+              <a:fillRef idx="0">
+                <a:schemeClr val="accent1"/>
+              </a:fillRef>
+              <a:effectRef idx="0">
+                <a:schemeClr val="accent1"/>
+              </a:effectRef>
+              <a:fontRef idx="minor">
+                <a:schemeClr val="tx1"/>
+              </a:fontRef>
+            </p:style>
+          </p:cxnSp>
+          <p:cxnSp>
+            <p:nvCxnSpPr>
+              <p:cNvPr id="39" name="Straight Arrow Connector 38">
+                <a:extLst>
+                  <a:ext uri="{FF2B5EF4-FFF2-40B4-BE49-F238E27FC236}">
+                    <a16:creationId xmlns:a16="http://schemas.microsoft.com/office/drawing/2014/main" id="{9EFDEEF8-485E-4DC4-A5CB-D601F6BA3880}"/>
+                  </a:ext>
+                </a:extLst>
+              </p:cNvPr>
+              <p:cNvCxnSpPr>
+                <a:stCxn id="7" idx="3"/>
+                <a:endCxn id="9" idx="1"/>
+              </p:cNvCxnSpPr>
+              <p:nvPr/>
+            </p:nvCxnSpPr>
+            <p:spPr>
+              <a:xfrm>
+                <a:off x="5965371" y="2668556"/>
+                <a:ext cx="376335" cy="0"/>
+              </a:xfrm>
+              <a:prstGeom prst="straightConnector1">
+                <a:avLst/>
+              </a:prstGeom>
+              <a:ln>
+                <a:tailEnd type="triangle"/>
+              </a:ln>
+            </p:spPr>
+            <p:style>
+              <a:lnRef idx="1">
+                <a:schemeClr val="accent1"/>
+              </a:lnRef>
+              <a:fillRef idx="0">
+                <a:schemeClr val="accent1"/>
+              </a:fillRef>
+              <a:effectRef idx="0">
+                <a:schemeClr val="accent1"/>
+              </a:effectRef>
+              <a:fontRef idx="minor">
+                <a:schemeClr val="tx1"/>
+              </a:fontRef>
+            </p:style>
+          </p:cxnSp>
+          <p:cxnSp>
+            <p:nvCxnSpPr>
+              <p:cNvPr id="47" name="Straight Arrow Connector 46">
+                <a:extLst>
+                  <a:ext uri="{FF2B5EF4-FFF2-40B4-BE49-F238E27FC236}">
+                    <a16:creationId xmlns:a16="http://schemas.microsoft.com/office/drawing/2014/main" id="{EA337281-633A-44B5-9538-AEA2917CDBC3}"/>
+                  </a:ext>
+                </a:extLst>
+              </p:cNvPr>
+              <p:cNvCxnSpPr>
+                <a:stCxn id="5" idx="3"/>
+                <a:endCxn id="11" idx="1"/>
+              </p:cNvCxnSpPr>
+              <p:nvPr/>
+            </p:nvCxnSpPr>
+            <p:spPr>
+              <a:xfrm>
+                <a:off x="3763347" y="3834882"/>
+                <a:ext cx="373224" cy="0"/>
+              </a:xfrm>
+              <a:prstGeom prst="straightConnector1">
+                <a:avLst/>
+              </a:prstGeom>
+              <a:ln>
+                <a:tailEnd type="triangle"/>
+              </a:ln>
+            </p:spPr>
+            <p:style>
+              <a:lnRef idx="1">
+                <a:schemeClr val="accent1"/>
+              </a:lnRef>
+              <a:fillRef idx="0">
+                <a:schemeClr val="accent1"/>
+              </a:fillRef>
+              <a:effectRef idx="0">
+                <a:schemeClr val="accent1"/>
+              </a:effectRef>
+              <a:fontRef idx="minor">
+                <a:schemeClr val="tx1"/>
+              </a:fontRef>
+            </p:style>
+          </p:cxnSp>
+          <p:cxnSp>
+            <p:nvCxnSpPr>
+              <p:cNvPr id="49" name="Connector: Elbow 48">
+                <a:extLst>
+                  <a:ext uri="{FF2B5EF4-FFF2-40B4-BE49-F238E27FC236}">
+                    <a16:creationId xmlns:a16="http://schemas.microsoft.com/office/drawing/2014/main" id="{DF843EE8-8251-4988-A8E7-0CC7687143A5}"/>
+                  </a:ext>
+                </a:extLst>
+              </p:cNvPr>
+              <p:cNvCxnSpPr>
+                <a:stCxn id="5" idx="3"/>
+                <a:endCxn id="13" idx="1"/>
+              </p:cNvCxnSpPr>
+              <p:nvPr/>
+            </p:nvCxnSpPr>
+            <p:spPr>
+              <a:xfrm>
+                <a:off x="3763347" y="3834882"/>
+                <a:ext cx="377889" cy="1166326"/>
+              </a:xfrm>
+              <a:prstGeom prst="bentConnector3">
+                <a:avLst/>
+              </a:prstGeom>
+              <a:ln>
+                <a:tailEnd type="triangle"/>
+              </a:ln>
+            </p:spPr>
+            <p:style>
+              <a:lnRef idx="1">
+                <a:schemeClr val="accent1"/>
+              </a:lnRef>
+              <a:fillRef idx="0">
+                <a:schemeClr val="accent1"/>
+              </a:fillRef>
+              <a:effectRef idx="0">
+                <a:schemeClr val="accent1"/>
+              </a:effectRef>
+              <a:fontRef idx="minor">
+                <a:schemeClr val="tx1"/>
+              </a:fontRef>
+            </p:style>
+          </p:cxnSp>
+          <p:sp>
+            <p:nvSpPr>
+              <p:cNvPr id="53" name="Rectangle: Rounded Corners 52">
+                <a:extLst>
+                  <a:ext uri="{FF2B5EF4-FFF2-40B4-BE49-F238E27FC236}">
+                    <a16:creationId xmlns:a16="http://schemas.microsoft.com/office/drawing/2014/main" id="{07C01069-7924-4652-A3A9-FCC8774093D1}"/>
+                  </a:ext>
+                </a:extLst>
+              </p:cNvPr>
+              <p:cNvSpPr/>
+              <p:nvPr/>
+            </p:nvSpPr>
+            <p:spPr>
+              <a:xfrm>
+                <a:off x="3940498" y="1026370"/>
+                <a:ext cx="2155502" cy="503853"/>
+              </a:xfrm>
+              <a:prstGeom prst="roundRect">
+                <a:avLst/>
+              </a:prstGeom>
+              <a:noFill/>
+            </p:spPr>
+            <p:style>
+              <a:lnRef idx="2">
+                <a:schemeClr val="accent1">
+                  <a:shade val="50000"/>
+                </a:schemeClr>
+              </a:lnRef>
+              <a:fillRef idx="1">
+                <a:schemeClr val="accent1"/>
+              </a:fillRef>
+              <a:effectRef idx="0">
+                <a:schemeClr val="accent1"/>
+              </a:effectRef>
+              <a:fontRef idx="minor">
+                <a:schemeClr val="lt1"/>
+              </a:fontRef>
+            </p:style>
+            <p:txBody>
+              <a:bodyPr rtlCol="0" anchor="ctr"/>
+              <a:lstStyle/>
+              <a:p>
+                <a:pPr algn="ctr"/>
+                <a:r>
+                  <a:rPr lang="en-US" altLang="zh-CN" dirty="0">
+                    <a:solidFill>
+                      <a:schemeClr val="tx1"/>
+                    </a:solidFill>
+                  </a:rPr>
+                  <a:t>Attribute related questions</a:t>
+                </a:r>
+                <a:endParaRPr lang="en-US" dirty="0">
+                  <a:solidFill>
+                    <a:schemeClr val="tx1"/>
+                  </a:solidFill>
+                </a:endParaRPr>
+              </a:p>
+            </p:txBody>
+          </p:sp>
+          <p:sp>
+            <p:nvSpPr>
+              <p:cNvPr id="55" name="Rectangle: Rounded Corners 54">
+                <a:extLst>
+                  <a:ext uri="{FF2B5EF4-FFF2-40B4-BE49-F238E27FC236}">
+                    <a16:creationId xmlns:a16="http://schemas.microsoft.com/office/drawing/2014/main" id="{EF5E7D9C-FBAA-4A21-95BB-A498484A59B0}"/>
+                  </a:ext>
+                </a:extLst>
+              </p:cNvPr>
+              <p:cNvSpPr/>
+              <p:nvPr/>
+            </p:nvSpPr>
+            <p:spPr>
+              <a:xfrm>
+                <a:off x="8383490" y="1026369"/>
+                <a:ext cx="2155502" cy="503853"/>
+              </a:xfrm>
+              <a:prstGeom prst="roundRect">
+                <a:avLst/>
+              </a:prstGeom>
+              <a:noFill/>
+            </p:spPr>
+            <p:style>
+              <a:lnRef idx="2">
+                <a:schemeClr val="accent1">
+                  <a:shade val="50000"/>
+                </a:schemeClr>
+              </a:lnRef>
+              <a:fillRef idx="1">
+                <a:schemeClr val="accent1"/>
+              </a:fillRef>
+              <a:effectRef idx="0">
+                <a:schemeClr val="accent1"/>
+              </a:effectRef>
+              <a:fontRef idx="minor">
+                <a:schemeClr val="lt1"/>
+              </a:fontRef>
+            </p:style>
+            <p:txBody>
+              <a:bodyPr rtlCol="0" anchor="ctr"/>
+              <a:lstStyle/>
+              <a:p>
+                <a:pPr algn="ctr"/>
+                <a:r>
+                  <a:rPr lang="en-US" altLang="zh-CN" dirty="0">
+                    <a:solidFill>
+                      <a:schemeClr val="tx1"/>
+                    </a:solidFill>
+                  </a:rPr>
+                  <a:t>Spatial related questions</a:t>
+                </a:r>
+                <a:endParaRPr lang="en-US" dirty="0">
+                  <a:solidFill>
+                    <a:schemeClr val="tx1"/>
+                  </a:solidFill>
+                </a:endParaRPr>
+              </a:p>
+            </p:txBody>
+          </p:sp>
+          <p:sp>
+            <p:nvSpPr>
+              <p:cNvPr id="56" name="Rectangle 55">
+                <a:extLst>
+                  <a:ext uri="{FF2B5EF4-FFF2-40B4-BE49-F238E27FC236}">
+                    <a16:creationId xmlns:a16="http://schemas.microsoft.com/office/drawing/2014/main" id="{A9198338-5093-4F0A-8549-D173158A3DB7}"/>
+                  </a:ext>
+                </a:extLst>
+              </p:cNvPr>
+              <p:cNvSpPr/>
+              <p:nvPr/>
+            </p:nvSpPr>
+            <p:spPr>
+              <a:xfrm>
+                <a:off x="1679510" y="905069"/>
+                <a:ext cx="6559398" cy="4674637"/>
+              </a:xfrm>
+              <a:prstGeom prst="rect">
+                <a:avLst/>
+              </a:prstGeom>
+              <a:noFill/>
+              <a:ln>
+                <a:prstDash val="dash"/>
+              </a:ln>
+            </p:spPr>
+            <p:style>
+              <a:lnRef idx="2">
+                <a:schemeClr val="accent1">
+                  <a:shade val="50000"/>
+                </a:schemeClr>
+              </a:lnRef>
+              <a:fillRef idx="1">
+                <a:schemeClr val="accent1"/>
+              </a:fillRef>
+              <a:effectRef idx="0">
+                <a:schemeClr val="accent1"/>
+              </a:effectRef>
+              <a:fontRef idx="minor">
+                <a:schemeClr val="lt1"/>
+              </a:fontRef>
+            </p:style>
+            <p:txBody>
+              <a:bodyPr rtlCol="0" anchor="ctr"/>
+              <a:lstStyle/>
+              <a:p>
+                <a:pPr algn="ctr"/>
+                <a:endParaRPr lang="en-US"/>
+              </a:p>
+            </p:txBody>
+          </p:sp>
+          <p:sp>
+            <p:nvSpPr>
+              <p:cNvPr id="58" name="Rectangle 57">
+                <a:extLst>
+                  <a:ext uri="{FF2B5EF4-FFF2-40B4-BE49-F238E27FC236}">
+                    <a16:creationId xmlns:a16="http://schemas.microsoft.com/office/drawing/2014/main" id="{CE1ADF4D-07F0-41FA-BDBA-1E574D1D3181}"/>
+                  </a:ext>
+                </a:extLst>
+              </p:cNvPr>
+              <p:cNvSpPr/>
+              <p:nvPr/>
+            </p:nvSpPr>
+            <p:spPr>
+              <a:xfrm>
+                <a:off x="8238908" y="905068"/>
+                <a:ext cx="2572008" cy="4674637"/>
+              </a:xfrm>
+              <a:prstGeom prst="rect">
+                <a:avLst/>
+              </a:prstGeom>
+              <a:noFill/>
+              <a:ln>
+                <a:prstDash val="dash"/>
+              </a:ln>
+            </p:spPr>
+            <p:style>
+              <a:lnRef idx="2">
+                <a:schemeClr val="accent1">
+                  <a:shade val="50000"/>
+                </a:schemeClr>
+              </a:lnRef>
+              <a:fillRef idx="1">
+                <a:schemeClr val="accent1"/>
+              </a:fillRef>
+              <a:effectRef idx="0">
+                <a:schemeClr val="accent1"/>
+              </a:effectRef>
+              <a:fontRef idx="minor">
+                <a:schemeClr val="lt1"/>
+              </a:fontRef>
+            </p:style>
+            <p:txBody>
+              <a:bodyPr rtlCol="0" anchor="ctr"/>
+              <a:lstStyle/>
+              <a:p>
+                <a:pPr algn="ctr"/>
+                <a:endParaRPr lang="en-US"/>
+              </a:p>
+            </p:txBody>
+          </p:sp>
+          <p:sp>
+            <p:nvSpPr>
+              <p:cNvPr id="60" name="Rectangle: Rounded Corners 59">
+                <a:extLst>
+                  <a:ext uri="{FF2B5EF4-FFF2-40B4-BE49-F238E27FC236}">
+                    <a16:creationId xmlns:a16="http://schemas.microsoft.com/office/drawing/2014/main" id="{639BFD10-6B78-4739-9FA6-016C81C60011}"/>
+                  </a:ext>
+                </a:extLst>
+              </p:cNvPr>
+              <p:cNvSpPr/>
+              <p:nvPr/>
+            </p:nvSpPr>
+            <p:spPr>
+              <a:xfrm>
+                <a:off x="3828531" y="5645017"/>
+                <a:ext cx="4926694" cy="503853"/>
+              </a:xfrm>
+              <a:prstGeom prst="roundRect">
+                <a:avLst/>
+              </a:prstGeom>
+              <a:noFill/>
+            </p:spPr>
+            <p:style>
+              <a:lnRef idx="2">
+                <a:schemeClr val="accent1">
+                  <a:shade val="50000"/>
+                </a:schemeClr>
+              </a:lnRef>
+              <a:fillRef idx="1">
+                <a:schemeClr val="accent1"/>
+              </a:fillRef>
+              <a:effectRef idx="0">
+                <a:schemeClr val="accent1"/>
+              </a:effectRef>
+              <a:fontRef idx="minor">
+                <a:schemeClr val="lt1"/>
+              </a:fontRef>
+            </p:style>
+            <p:txBody>
+              <a:bodyPr rtlCol="0" anchor="ctr"/>
+              <a:lstStyle/>
+              <a:p>
+                <a:pPr algn="ctr"/>
+                <a:r>
+                  <a:rPr lang="en-US" altLang="zh-CN" dirty="0">
+                    <a:solidFill>
+                      <a:schemeClr val="tx1"/>
+                    </a:solidFill>
+                  </a:rPr>
+                  <a:t>Both attribute and spatial related questions</a:t>
+                </a:r>
+                <a:endParaRPr lang="en-US" dirty="0">
+                  <a:solidFill>
+                    <a:schemeClr val="tx1"/>
+                  </a:solidFill>
+                </a:endParaRPr>
+              </a:p>
+            </p:txBody>
+          </p:sp>
+          <p:sp>
+            <p:nvSpPr>
+              <p:cNvPr id="62" name="Rectangle 61">
+                <a:extLst>
+                  <a:ext uri="{FF2B5EF4-FFF2-40B4-BE49-F238E27FC236}">
+                    <a16:creationId xmlns:a16="http://schemas.microsoft.com/office/drawing/2014/main" id="{99763728-39D9-47D5-B48E-BDDEF1342124}"/>
+                  </a:ext>
+                </a:extLst>
+              </p:cNvPr>
+              <p:cNvSpPr/>
+              <p:nvPr/>
+            </p:nvSpPr>
+            <p:spPr>
+              <a:xfrm>
+                <a:off x="1586210" y="709131"/>
+                <a:ext cx="9321276" cy="5505058"/>
+              </a:xfrm>
+              <a:prstGeom prst="rect">
+                <a:avLst/>
+              </a:prstGeom>
+              <a:noFill/>
+              <a:ln>
+                <a:prstDash val="solid"/>
+              </a:ln>
+            </p:spPr>
+            <p:style>
+              <a:lnRef idx="2">
+                <a:schemeClr val="accent1">
+                  <a:shade val="50000"/>
+                </a:schemeClr>
+              </a:lnRef>
+              <a:fillRef idx="1">
+                <a:schemeClr val="accent1"/>
+              </a:fillRef>
+              <a:effectRef idx="0">
+                <a:schemeClr val="accent1"/>
+              </a:effectRef>
+              <a:fontRef idx="minor">
+                <a:schemeClr val="lt1"/>
+              </a:fontRef>
+            </p:style>
+            <p:txBody>
+              <a:bodyPr rtlCol="0" anchor="ctr"/>
+              <a:lstStyle/>
+              <a:p>
+                <a:pPr algn="ctr"/>
+                <a:endParaRPr lang="en-US"/>
+              </a:p>
+            </p:txBody>
+          </p:sp>
+        </p:grpSp>
+        <p:cxnSp>
+          <p:nvCxnSpPr>
+            <p:cNvPr id="3" name="Straight Arrow Connector 2">
+              <a:extLst>
+                <a:ext uri="{FF2B5EF4-FFF2-40B4-BE49-F238E27FC236}">
+                  <a16:creationId xmlns:a16="http://schemas.microsoft.com/office/drawing/2014/main" id="{86CE9EAB-56AD-4E5C-AF47-5B98DD48776C}"/>
+                </a:ext>
+              </a:extLst>
+            </p:cNvPr>
+            <p:cNvCxnSpPr>
+              <a:stCxn id="7" idx="2"/>
+              <a:endCxn id="11" idx="0"/>
+            </p:cNvCxnSpPr>
+            <p:nvPr/>
+          </p:nvCxnSpPr>
+          <p:spPr>
+            <a:xfrm>
+              <a:off x="5050971" y="3144417"/>
+              <a:ext cx="0" cy="214604"/>
+            </a:xfrm>
+            <a:prstGeom prst="straightConnector1">
+              <a:avLst/>
+            </a:prstGeom>
+            <a:ln>
+              <a:tailEnd type="triangle"/>
+            </a:ln>
+          </p:spPr>
+          <p:style>
+            <a:lnRef idx="1">
+              <a:schemeClr val="accent1"/>
+            </a:lnRef>
+            <a:fillRef idx="0">
+              <a:schemeClr val="accent1"/>
+            </a:fillRef>
+            <a:effectRef idx="0">
+              <a:schemeClr val="accent1"/>
+            </a:effectRef>
+            <a:fontRef idx="minor">
+              <a:schemeClr val="tx1"/>
+            </a:fontRef>
+          </p:style>
+        </p:cxnSp>
         <p:sp>
           <p:nvSpPr>
-            <p:cNvPr id="5" name="Rectangle 4">
+            <p:cNvPr id="4" name="Rectangle 3">
               <a:extLst>
                 <a:ext uri="{FF2B5EF4-FFF2-40B4-BE49-F238E27FC236}">
-                  <a16:creationId xmlns:a16="http://schemas.microsoft.com/office/drawing/2014/main" id="{986FAA45-2516-48CC-AB3A-8206B88358CB}"/>
+                  <a16:creationId xmlns:a16="http://schemas.microsoft.com/office/drawing/2014/main" id="{9D3691B7-3AEC-428A-9AD1-63556C74039F}"/>
                 </a:ext>
               </a:extLst>
             </p:cNvPr>
@@ -3355,181 +4472,8 @@
           </p:nvSpPr>
           <p:spPr>
             <a:xfrm>
-              <a:off x="1934547" y="3359021"/>
-              <a:ext cx="1828800" cy="951722"/>
-            </a:xfrm>
-            <a:prstGeom prst="rect">
-              <a:avLst/>
-            </a:prstGeom>
-            <a:noFill/>
-          </p:spPr>
-          <p:style>
-            <a:lnRef idx="2">
-              <a:schemeClr val="accent1">
-                <a:shade val="50000"/>
-              </a:schemeClr>
-            </a:lnRef>
-            <a:fillRef idx="1">
-              <a:schemeClr val="accent1"/>
-            </a:fillRef>
-            <a:effectRef idx="0">
-              <a:schemeClr val="accent1"/>
-            </a:effectRef>
-            <a:fontRef idx="minor">
-              <a:schemeClr val="lt1"/>
-            </a:fontRef>
-          </p:style>
-          <p:txBody>
-            <a:bodyPr rtlCol="0" anchor="ctr"/>
-            <a:lstStyle/>
-            <a:p>
-              <a:pPr algn="ctr"/>
-              <a:r>
-                <a:rPr lang="en-US" dirty="0">
-                  <a:solidFill>
-                    <a:schemeClr val="tx1"/>
-                  </a:solidFill>
-                </a:rPr>
-                <a:t>Map element detection</a:t>
-              </a:r>
-            </a:p>
-          </p:txBody>
-        </p:sp>
-        <p:sp>
-          <p:nvSpPr>
-            <p:cNvPr id="7" name="Rectangle 6">
-              <a:extLst>
-                <a:ext uri="{FF2B5EF4-FFF2-40B4-BE49-F238E27FC236}">
-                  <a16:creationId xmlns:a16="http://schemas.microsoft.com/office/drawing/2014/main" id="{5B5C2C04-508F-4E94-9CF8-98514A8FF68A}"/>
-                </a:ext>
-              </a:extLst>
-            </p:cNvPr>
-            <p:cNvSpPr/>
-            <p:nvPr/>
-          </p:nvSpPr>
-          <p:spPr>
-            <a:xfrm>
-              <a:off x="4136571" y="2192695"/>
-              <a:ext cx="1828800" cy="951722"/>
-            </a:xfrm>
-            <a:prstGeom prst="rect">
-              <a:avLst/>
-            </a:prstGeom>
-            <a:noFill/>
-          </p:spPr>
-          <p:style>
-            <a:lnRef idx="2">
-              <a:schemeClr val="accent1">
-                <a:shade val="50000"/>
-              </a:schemeClr>
-            </a:lnRef>
-            <a:fillRef idx="1">
-              <a:schemeClr val="accent1"/>
-            </a:fillRef>
-            <a:effectRef idx="0">
-              <a:schemeClr val="accent1"/>
-            </a:effectRef>
-            <a:fontRef idx="minor">
-              <a:schemeClr val="lt1"/>
-            </a:fontRef>
-          </p:style>
-          <p:txBody>
-            <a:bodyPr rtlCol="0" anchor="ctr"/>
-            <a:lstStyle/>
-            <a:p>
-              <a:pPr algn="ctr"/>
-              <a:r>
-                <a:rPr lang="en-US" dirty="0">
-                  <a:solidFill>
-                    <a:schemeClr val="tx1"/>
-                  </a:solidFill>
-                </a:rPr>
-                <a:t>Text recognition</a:t>
-              </a:r>
-            </a:p>
-            <a:p>
-              <a:pPr algn="ctr"/>
-              <a:r>
-                <a:rPr lang="en-US" dirty="0">
-                  <a:solidFill>
-                    <a:schemeClr val="tx1"/>
-                  </a:solidFill>
-                </a:rPr>
-                <a:t>(OCR)</a:t>
-              </a:r>
-            </a:p>
-          </p:txBody>
-        </p:sp>
-        <p:sp>
-          <p:nvSpPr>
-            <p:cNvPr id="9" name="Rectangle 8">
-              <a:extLst>
-                <a:ext uri="{FF2B5EF4-FFF2-40B4-BE49-F238E27FC236}">
-                  <a16:creationId xmlns:a16="http://schemas.microsoft.com/office/drawing/2014/main" id="{DDAD67B1-0797-464C-91E0-5942D6FB5B58}"/>
-                </a:ext>
-              </a:extLst>
-            </p:cNvPr>
-            <p:cNvSpPr/>
-            <p:nvPr/>
-          </p:nvSpPr>
-          <p:spPr>
-            <a:xfrm>
-              <a:off x="6341706" y="2192695"/>
-              <a:ext cx="1828800" cy="951722"/>
-            </a:xfrm>
-            <a:prstGeom prst="rect">
-              <a:avLst/>
-            </a:prstGeom>
-            <a:noFill/>
-          </p:spPr>
-          <p:style>
-            <a:lnRef idx="2">
-              <a:schemeClr val="accent1">
-                <a:shade val="50000"/>
-              </a:schemeClr>
-            </a:lnRef>
-            <a:fillRef idx="1">
-              <a:schemeClr val="accent1"/>
-            </a:fillRef>
-            <a:effectRef idx="0">
-              <a:schemeClr val="accent1"/>
-            </a:effectRef>
-            <a:fontRef idx="minor">
-              <a:schemeClr val="lt1"/>
-            </a:fontRef>
-          </p:style>
-          <p:txBody>
-            <a:bodyPr rtlCol="0" anchor="ctr"/>
-            <a:lstStyle/>
-            <a:p>
-              <a:pPr algn="ctr"/>
-              <a:r>
-                <a:rPr lang="en-US" dirty="0">
-                  <a:solidFill>
-                    <a:schemeClr val="tx1"/>
-                  </a:solidFill>
-                </a:rPr>
-                <a:t>Extract topic et al</a:t>
-              </a:r>
-            </a:p>
-          </p:txBody>
-        </p:sp>
-        <p:sp>
-          <p:nvSpPr>
-            <p:cNvPr id="11" name="Rectangle 10">
-              <a:extLst>
-                <a:ext uri="{FF2B5EF4-FFF2-40B4-BE49-F238E27FC236}">
-                  <a16:creationId xmlns:a16="http://schemas.microsoft.com/office/drawing/2014/main" id="{A8D043ED-9D83-44A7-B68E-DC0D9E8D63D6}"/>
-                </a:ext>
-              </a:extLst>
-            </p:cNvPr>
-            <p:cNvSpPr/>
-            <p:nvPr/>
-          </p:nvSpPr>
-          <p:spPr>
-            <a:xfrm>
-              <a:off x="4136571" y="3359021"/>
-              <a:ext cx="1828800" cy="951722"/>
+              <a:off x="105746" y="3069771"/>
+              <a:ext cx="1383893" cy="578500"/>
             </a:xfrm>
             <a:prstGeom prst="rect">
               <a:avLst/>
@@ -3563,7 +4507,7 @@
                     <a:schemeClr val="tx1"/>
                   </a:solidFill>
                 </a:rPr>
-                <a:t>Legend analysis</a:t>
+                <a:t>Questions</a:t>
               </a:r>
               <a:endParaRPr lang="en-US" dirty="0">
                 <a:solidFill>
@@ -3575,10 +4519,10 @@
         </p:sp>
         <p:sp>
           <p:nvSpPr>
-            <p:cNvPr id="13" name="Rectangle 12">
+            <p:cNvPr id="6" name="Rectangle 5">
               <a:extLst>
                 <a:ext uri="{FF2B5EF4-FFF2-40B4-BE49-F238E27FC236}">
-                  <a16:creationId xmlns:a16="http://schemas.microsoft.com/office/drawing/2014/main" id="{65A8F675-8318-4A5A-AE81-8287B5462CD5}"/>
+                  <a16:creationId xmlns:a16="http://schemas.microsoft.com/office/drawing/2014/main" id="{5AD3F233-78BC-407D-BF22-0FA36C178BEE}"/>
                 </a:ext>
               </a:extLst>
             </p:cNvPr>
@@ -3587,489 +4531,10 @@
           </p:nvSpPr>
           <p:spPr>
             <a:xfrm>
-              <a:off x="4141236" y="4525347"/>
-              <a:ext cx="1828800" cy="951722"/>
+              <a:off x="11000786" y="3069771"/>
+              <a:ext cx="1383893" cy="578500"/>
             </a:xfrm>
             <a:prstGeom prst="rect">
-              <a:avLst/>
-            </a:prstGeom>
-            <a:noFill/>
-          </p:spPr>
-          <p:style>
-            <a:lnRef idx="2">
-              <a:schemeClr val="accent1">
-                <a:shade val="50000"/>
-              </a:schemeClr>
-            </a:lnRef>
-            <a:fillRef idx="1">
-              <a:schemeClr val="accent1"/>
-            </a:fillRef>
-            <a:effectRef idx="0">
-              <a:schemeClr val="accent1"/>
-            </a:effectRef>
-            <a:fontRef idx="minor">
-              <a:schemeClr val="lt1"/>
-            </a:fontRef>
-          </p:style>
-          <p:txBody>
-            <a:bodyPr rtlCol="0" anchor="ctr"/>
-            <a:lstStyle/>
-            <a:p>
-              <a:pPr algn="ctr"/>
-              <a:r>
-                <a:rPr lang="en-US" dirty="0">
-                  <a:solidFill>
-                    <a:schemeClr val="tx1"/>
-                  </a:solidFill>
-                </a:rPr>
-                <a:t>State detection</a:t>
-              </a:r>
-            </a:p>
-            <a:p>
-              <a:pPr algn="ctr"/>
-              <a:r>
-                <a:rPr lang="en-US" dirty="0">
-                  <a:solidFill>
-                    <a:schemeClr val="tx1"/>
-                  </a:solidFill>
-                </a:rPr>
-                <a:t>(template matching)</a:t>
-              </a:r>
-            </a:p>
-          </p:txBody>
-        </p:sp>
-        <p:sp>
-          <p:nvSpPr>
-            <p:cNvPr id="15" name="Rectangle 14">
-              <a:extLst>
-                <a:ext uri="{FF2B5EF4-FFF2-40B4-BE49-F238E27FC236}">
-                  <a16:creationId xmlns:a16="http://schemas.microsoft.com/office/drawing/2014/main" id="{722C8BAA-BB08-4EE3-AA48-323FF8249C54}"/>
-                </a:ext>
-              </a:extLst>
-            </p:cNvPr>
-            <p:cNvSpPr/>
-            <p:nvPr/>
-          </p:nvSpPr>
-          <p:spPr>
-            <a:xfrm>
-              <a:off x="8546841" y="3359021"/>
-              <a:ext cx="1828800" cy="951722"/>
-            </a:xfrm>
-            <a:prstGeom prst="rect">
-              <a:avLst/>
-            </a:prstGeom>
-            <a:noFill/>
-          </p:spPr>
-          <p:style>
-            <a:lnRef idx="2">
-              <a:schemeClr val="accent1">
-                <a:shade val="50000"/>
-              </a:schemeClr>
-            </a:lnRef>
-            <a:fillRef idx="1">
-              <a:schemeClr val="accent1"/>
-            </a:fillRef>
-            <a:effectRef idx="0">
-              <a:schemeClr val="accent1"/>
-            </a:effectRef>
-            <a:fontRef idx="minor">
-              <a:schemeClr val="lt1"/>
-            </a:fontRef>
-          </p:style>
-          <p:txBody>
-            <a:bodyPr rtlCol="0" anchor="ctr"/>
-            <a:lstStyle/>
-            <a:p>
-              <a:pPr algn="ctr"/>
-              <a:r>
-                <a:rPr lang="en-US" dirty="0">
-                  <a:solidFill>
-                    <a:schemeClr val="tx1"/>
-                  </a:solidFill>
-                </a:rPr>
-                <a:t>Spatial relation analysis</a:t>
-              </a:r>
-            </a:p>
-          </p:txBody>
-        </p:sp>
-        <p:sp>
-          <p:nvSpPr>
-            <p:cNvPr id="18" name="Rectangle: Single Corner Snipped 17">
-              <a:extLst>
-                <a:ext uri="{FF2B5EF4-FFF2-40B4-BE49-F238E27FC236}">
-                  <a16:creationId xmlns:a16="http://schemas.microsoft.com/office/drawing/2014/main" id="{689CB3BA-FE81-418F-8A5D-B3D9E4E1F24E}"/>
-                </a:ext>
-              </a:extLst>
-            </p:cNvPr>
-            <p:cNvSpPr/>
-            <p:nvPr/>
-          </p:nvSpPr>
-          <p:spPr>
-            <a:xfrm>
-              <a:off x="2133470" y="1800805"/>
-              <a:ext cx="1412032" cy="569167"/>
-            </a:xfrm>
-            <a:prstGeom prst="snip1Rect">
-              <a:avLst/>
-            </a:prstGeom>
-            <a:noFill/>
-          </p:spPr>
-          <p:style>
-            <a:lnRef idx="2">
-              <a:schemeClr val="accent1">
-                <a:shade val="50000"/>
-              </a:schemeClr>
-            </a:lnRef>
-            <a:fillRef idx="1">
-              <a:schemeClr val="accent1"/>
-            </a:fillRef>
-            <a:effectRef idx="0">
-              <a:schemeClr val="accent1"/>
-            </a:effectRef>
-            <a:fontRef idx="minor">
-              <a:schemeClr val="lt1"/>
-            </a:fontRef>
-          </p:style>
-          <p:txBody>
-            <a:bodyPr rtlCol="0" anchor="ctr"/>
-            <a:lstStyle/>
-            <a:p>
-              <a:pPr algn="ctr"/>
-              <a:r>
-                <a:rPr lang="en-US" dirty="0">
-                  <a:solidFill>
-                    <a:schemeClr val="tx1"/>
-                  </a:solidFill>
-                </a:rPr>
-                <a:t>Choropleth map images</a:t>
-              </a:r>
-            </a:p>
-          </p:txBody>
-        </p:sp>
-        <p:sp>
-          <p:nvSpPr>
-            <p:cNvPr id="20" name="Rectangle: Single Corner Snipped 19">
-              <a:extLst>
-                <a:ext uri="{FF2B5EF4-FFF2-40B4-BE49-F238E27FC236}">
-                  <a16:creationId xmlns:a16="http://schemas.microsoft.com/office/drawing/2014/main" id="{357F4308-64AC-4177-AA58-2E35A4C39C51}"/>
-                </a:ext>
-              </a:extLst>
-            </p:cNvPr>
-            <p:cNvSpPr/>
-            <p:nvPr/>
-          </p:nvSpPr>
-          <p:spPr>
-            <a:xfrm>
-              <a:off x="8755225" y="1800805"/>
-              <a:ext cx="1412032" cy="569167"/>
-            </a:xfrm>
-            <a:prstGeom prst="snip1Rect">
-              <a:avLst/>
-            </a:prstGeom>
-            <a:noFill/>
-          </p:spPr>
-          <p:style>
-            <a:lnRef idx="2">
-              <a:schemeClr val="accent1">
-                <a:shade val="50000"/>
-              </a:schemeClr>
-            </a:lnRef>
-            <a:fillRef idx="1">
-              <a:schemeClr val="accent1"/>
-            </a:fillRef>
-            <a:effectRef idx="0">
-              <a:schemeClr val="accent1"/>
-            </a:effectRef>
-            <a:fontRef idx="minor">
-              <a:schemeClr val="lt1"/>
-            </a:fontRef>
-          </p:style>
-          <p:txBody>
-            <a:bodyPr rtlCol="0" anchor="ctr"/>
-            <a:lstStyle/>
-            <a:p>
-              <a:pPr algn="ctr"/>
-              <a:r>
-                <a:rPr lang="en-US" dirty="0">
-                  <a:solidFill>
-                    <a:schemeClr val="tx1"/>
-                  </a:solidFill>
-                </a:rPr>
-                <a:t>Shapefile of the US</a:t>
-              </a:r>
-            </a:p>
-          </p:txBody>
-        </p:sp>
-        <p:cxnSp>
-          <p:nvCxnSpPr>
-            <p:cNvPr id="28" name="Connector: Elbow 27">
-              <a:extLst>
-                <a:ext uri="{FF2B5EF4-FFF2-40B4-BE49-F238E27FC236}">
-                  <a16:creationId xmlns:a16="http://schemas.microsoft.com/office/drawing/2014/main" id="{BFBBFF43-9F1A-4604-A328-3D84E2C4F2F6}"/>
-                </a:ext>
-              </a:extLst>
-            </p:cNvPr>
-            <p:cNvCxnSpPr>
-              <a:stCxn id="5" idx="3"/>
-              <a:endCxn id="7" idx="1"/>
-            </p:cNvCxnSpPr>
-            <p:nvPr/>
-          </p:nvCxnSpPr>
-          <p:spPr>
-            <a:xfrm flipV="1">
-              <a:off x="3763347" y="2668556"/>
-              <a:ext cx="373224" cy="1166326"/>
-            </a:xfrm>
-            <a:prstGeom prst="bentConnector3">
-              <a:avLst/>
-            </a:prstGeom>
-            <a:ln>
-              <a:tailEnd type="triangle"/>
-            </a:ln>
-          </p:spPr>
-          <p:style>
-            <a:lnRef idx="1">
-              <a:schemeClr val="accent1"/>
-            </a:lnRef>
-            <a:fillRef idx="0">
-              <a:schemeClr val="accent1"/>
-            </a:fillRef>
-            <a:effectRef idx="0">
-              <a:schemeClr val="accent1"/>
-            </a:effectRef>
-            <a:fontRef idx="minor">
-              <a:schemeClr val="tx1"/>
-            </a:fontRef>
-          </p:style>
-        </p:cxnSp>
-        <p:cxnSp>
-          <p:nvCxnSpPr>
-            <p:cNvPr id="33" name="Straight Arrow Connector 32">
-              <a:extLst>
-                <a:ext uri="{FF2B5EF4-FFF2-40B4-BE49-F238E27FC236}">
-                  <a16:creationId xmlns:a16="http://schemas.microsoft.com/office/drawing/2014/main" id="{8383D4A2-72FE-465B-8A66-30E46FA740C0}"/>
-                </a:ext>
-              </a:extLst>
-            </p:cNvPr>
-            <p:cNvCxnSpPr>
-              <a:stCxn id="18" idx="1"/>
-              <a:endCxn id="5" idx="0"/>
-            </p:cNvCxnSpPr>
-            <p:nvPr/>
-          </p:nvCxnSpPr>
-          <p:spPr>
-            <a:xfrm>
-              <a:off x="2839486" y="2369972"/>
-              <a:ext cx="9461" cy="989049"/>
-            </a:xfrm>
-            <a:prstGeom prst="straightConnector1">
-              <a:avLst/>
-            </a:prstGeom>
-            <a:ln>
-              <a:tailEnd type="triangle"/>
-            </a:ln>
-          </p:spPr>
-          <p:style>
-            <a:lnRef idx="1">
-              <a:schemeClr val="accent1"/>
-            </a:lnRef>
-            <a:fillRef idx="0">
-              <a:schemeClr val="accent1"/>
-            </a:fillRef>
-            <a:effectRef idx="0">
-              <a:schemeClr val="accent1"/>
-            </a:effectRef>
-            <a:fontRef idx="minor">
-              <a:schemeClr val="tx1"/>
-            </a:fontRef>
-          </p:style>
-        </p:cxnSp>
-        <p:cxnSp>
-          <p:nvCxnSpPr>
-            <p:cNvPr id="35" name="Straight Arrow Connector 34">
-              <a:extLst>
-                <a:ext uri="{FF2B5EF4-FFF2-40B4-BE49-F238E27FC236}">
-                  <a16:creationId xmlns:a16="http://schemas.microsoft.com/office/drawing/2014/main" id="{A32474B1-E44F-4B7B-B3ED-88180239E526}"/>
-                </a:ext>
-              </a:extLst>
-            </p:cNvPr>
-            <p:cNvCxnSpPr>
-              <a:stCxn id="20" idx="1"/>
-              <a:endCxn id="15" idx="0"/>
-            </p:cNvCxnSpPr>
-            <p:nvPr/>
-          </p:nvCxnSpPr>
-          <p:spPr>
-            <a:xfrm>
-              <a:off x="9461241" y="2369972"/>
-              <a:ext cx="0" cy="989049"/>
-            </a:xfrm>
-            <a:prstGeom prst="straightConnector1">
-              <a:avLst/>
-            </a:prstGeom>
-            <a:ln>
-              <a:tailEnd type="triangle"/>
-            </a:ln>
-          </p:spPr>
-          <p:style>
-            <a:lnRef idx="1">
-              <a:schemeClr val="accent1"/>
-            </a:lnRef>
-            <a:fillRef idx="0">
-              <a:schemeClr val="accent1"/>
-            </a:fillRef>
-            <a:effectRef idx="0">
-              <a:schemeClr val="accent1"/>
-            </a:effectRef>
-            <a:fontRef idx="minor">
-              <a:schemeClr val="tx1"/>
-            </a:fontRef>
-          </p:style>
-        </p:cxnSp>
-        <p:cxnSp>
-          <p:nvCxnSpPr>
-            <p:cNvPr id="39" name="Straight Arrow Connector 38">
-              <a:extLst>
-                <a:ext uri="{FF2B5EF4-FFF2-40B4-BE49-F238E27FC236}">
-                  <a16:creationId xmlns:a16="http://schemas.microsoft.com/office/drawing/2014/main" id="{9EFDEEF8-485E-4DC4-A5CB-D601F6BA3880}"/>
-                </a:ext>
-              </a:extLst>
-            </p:cNvPr>
-            <p:cNvCxnSpPr>
-              <a:stCxn id="7" idx="3"/>
-              <a:endCxn id="9" idx="1"/>
-            </p:cNvCxnSpPr>
-            <p:nvPr/>
-          </p:nvCxnSpPr>
-          <p:spPr>
-            <a:xfrm>
-              <a:off x="5965371" y="2668556"/>
-              <a:ext cx="376335" cy="0"/>
-            </a:xfrm>
-            <a:prstGeom prst="straightConnector1">
-              <a:avLst/>
-            </a:prstGeom>
-            <a:ln>
-              <a:tailEnd type="triangle"/>
-            </a:ln>
-          </p:spPr>
-          <p:style>
-            <a:lnRef idx="1">
-              <a:schemeClr val="accent1"/>
-            </a:lnRef>
-            <a:fillRef idx="0">
-              <a:schemeClr val="accent1"/>
-            </a:fillRef>
-            <a:effectRef idx="0">
-              <a:schemeClr val="accent1"/>
-            </a:effectRef>
-            <a:fontRef idx="minor">
-              <a:schemeClr val="tx1"/>
-            </a:fontRef>
-          </p:style>
-        </p:cxnSp>
-        <p:cxnSp>
-          <p:nvCxnSpPr>
-            <p:cNvPr id="47" name="Straight Arrow Connector 46">
-              <a:extLst>
-                <a:ext uri="{FF2B5EF4-FFF2-40B4-BE49-F238E27FC236}">
-                  <a16:creationId xmlns:a16="http://schemas.microsoft.com/office/drawing/2014/main" id="{EA337281-633A-44B5-9538-AEA2917CDBC3}"/>
-                </a:ext>
-              </a:extLst>
-            </p:cNvPr>
-            <p:cNvCxnSpPr>
-              <a:stCxn id="5" idx="3"/>
-              <a:endCxn id="11" idx="1"/>
-            </p:cNvCxnSpPr>
-            <p:nvPr/>
-          </p:nvCxnSpPr>
-          <p:spPr>
-            <a:xfrm>
-              <a:off x="3763347" y="3834882"/>
-              <a:ext cx="373224" cy="0"/>
-            </a:xfrm>
-            <a:prstGeom prst="straightConnector1">
-              <a:avLst/>
-            </a:prstGeom>
-            <a:ln>
-              <a:tailEnd type="triangle"/>
-            </a:ln>
-          </p:spPr>
-          <p:style>
-            <a:lnRef idx="1">
-              <a:schemeClr val="accent1"/>
-            </a:lnRef>
-            <a:fillRef idx="0">
-              <a:schemeClr val="accent1"/>
-            </a:fillRef>
-            <a:effectRef idx="0">
-              <a:schemeClr val="accent1"/>
-            </a:effectRef>
-            <a:fontRef idx="minor">
-              <a:schemeClr val="tx1"/>
-            </a:fontRef>
-          </p:style>
-        </p:cxnSp>
-        <p:cxnSp>
-          <p:nvCxnSpPr>
-            <p:cNvPr id="49" name="Connector: Elbow 48">
-              <a:extLst>
-                <a:ext uri="{FF2B5EF4-FFF2-40B4-BE49-F238E27FC236}">
-                  <a16:creationId xmlns:a16="http://schemas.microsoft.com/office/drawing/2014/main" id="{DF843EE8-8251-4988-A8E7-0CC7687143A5}"/>
-                </a:ext>
-              </a:extLst>
-            </p:cNvPr>
-            <p:cNvCxnSpPr>
-              <a:stCxn id="5" idx="3"/>
-              <a:endCxn id="13" idx="1"/>
-            </p:cNvCxnSpPr>
-            <p:nvPr/>
-          </p:nvCxnSpPr>
-          <p:spPr>
-            <a:xfrm>
-              <a:off x="3763347" y="3834882"/>
-              <a:ext cx="377889" cy="1166326"/>
-            </a:xfrm>
-            <a:prstGeom prst="bentConnector3">
-              <a:avLst/>
-            </a:prstGeom>
-            <a:ln>
-              <a:tailEnd type="triangle"/>
-            </a:ln>
-          </p:spPr>
-          <p:style>
-            <a:lnRef idx="1">
-              <a:schemeClr val="accent1"/>
-            </a:lnRef>
-            <a:fillRef idx="0">
-              <a:schemeClr val="accent1"/>
-            </a:fillRef>
-            <a:effectRef idx="0">
-              <a:schemeClr val="accent1"/>
-            </a:effectRef>
-            <a:fontRef idx="minor">
-              <a:schemeClr val="tx1"/>
-            </a:fontRef>
-          </p:style>
-        </p:cxnSp>
-        <p:sp>
-          <p:nvSpPr>
-            <p:cNvPr id="53" name="Rectangle: Rounded Corners 52">
-              <a:extLst>
-                <a:ext uri="{FF2B5EF4-FFF2-40B4-BE49-F238E27FC236}">
-                  <a16:creationId xmlns:a16="http://schemas.microsoft.com/office/drawing/2014/main" id="{07C01069-7924-4652-A3A9-FCC8774093D1}"/>
-                </a:ext>
-              </a:extLst>
-            </p:cNvPr>
-            <p:cNvSpPr/>
-            <p:nvPr/>
-          </p:nvSpPr>
-          <p:spPr>
-            <a:xfrm>
-              <a:off x="3940498" y="1026370"/>
-              <a:ext cx="2155502" cy="503853"/>
-            </a:xfrm>
-            <a:prstGeom prst="roundRect">
               <a:avLst/>
             </a:prstGeom>
             <a:noFill/>
@@ -4101,281 +4566,13 @@
                     <a:schemeClr val="tx1"/>
                   </a:solidFill>
                 </a:rPr>
-                <a:t>Attribute related questions</a:t>
+                <a:t>Answers</a:t>
               </a:r>
               <a:endParaRPr lang="en-US" dirty="0">
                 <a:solidFill>
                   <a:schemeClr val="tx1"/>
                 </a:solidFill>
               </a:endParaRPr>
-            </a:p>
-          </p:txBody>
-        </p:sp>
-        <p:sp>
-          <p:nvSpPr>
-            <p:cNvPr id="55" name="Rectangle: Rounded Corners 54">
-              <a:extLst>
-                <a:ext uri="{FF2B5EF4-FFF2-40B4-BE49-F238E27FC236}">
-                  <a16:creationId xmlns:a16="http://schemas.microsoft.com/office/drawing/2014/main" id="{EF5E7D9C-FBAA-4A21-95BB-A498484A59B0}"/>
-                </a:ext>
-              </a:extLst>
-            </p:cNvPr>
-            <p:cNvSpPr/>
-            <p:nvPr/>
-          </p:nvSpPr>
-          <p:spPr>
-            <a:xfrm>
-              <a:off x="8383490" y="1026369"/>
-              <a:ext cx="2155502" cy="503853"/>
-            </a:xfrm>
-            <a:prstGeom prst="roundRect">
-              <a:avLst/>
-            </a:prstGeom>
-            <a:noFill/>
-          </p:spPr>
-          <p:style>
-            <a:lnRef idx="2">
-              <a:schemeClr val="accent1">
-                <a:shade val="50000"/>
-              </a:schemeClr>
-            </a:lnRef>
-            <a:fillRef idx="1">
-              <a:schemeClr val="accent1"/>
-            </a:fillRef>
-            <a:effectRef idx="0">
-              <a:schemeClr val="accent1"/>
-            </a:effectRef>
-            <a:fontRef idx="minor">
-              <a:schemeClr val="lt1"/>
-            </a:fontRef>
-          </p:style>
-          <p:txBody>
-            <a:bodyPr rtlCol="0" anchor="ctr"/>
-            <a:lstStyle/>
-            <a:p>
-              <a:pPr algn="ctr"/>
-              <a:r>
-                <a:rPr lang="en-US" altLang="zh-CN" dirty="0">
-                  <a:solidFill>
-                    <a:schemeClr val="tx1"/>
-                  </a:solidFill>
-                </a:rPr>
-                <a:t>Spatial related questions</a:t>
-              </a:r>
-              <a:endParaRPr lang="en-US" dirty="0">
-                <a:solidFill>
-                  <a:schemeClr val="tx1"/>
-                </a:solidFill>
-              </a:endParaRPr>
-            </a:p>
-          </p:txBody>
-        </p:sp>
-        <p:sp>
-          <p:nvSpPr>
-            <p:cNvPr id="56" name="Rectangle 55">
-              <a:extLst>
-                <a:ext uri="{FF2B5EF4-FFF2-40B4-BE49-F238E27FC236}">
-                  <a16:creationId xmlns:a16="http://schemas.microsoft.com/office/drawing/2014/main" id="{A9198338-5093-4F0A-8549-D173158A3DB7}"/>
-                </a:ext>
-              </a:extLst>
-            </p:cNvPr>
-            <p:cNvSpPr/>
-            <p:nvPr/>
-          </p:nvSpPr>
-          <p:spPr>
-            <a:xfrm>
-              <a:off x="1679510" y="905069"/>
-              <a:ext cx="6559398" cy="4674637"/>
-            </a:xfrm>
-            <a:prstGeom prst="rect">
-              <a:avLst/>
-            </a:prstGeom>
-            <a:noFill/>
-            <a:ln>
-              <a:prstDash val="dash"/>
-            </a:ln>
-          </p:spPr>
-          <p:style>
-            <a:lnRef idx="2">
-              <a:schemeClr val="accent1">
-                <a:shade val="50000"/>
-              </a:schemeClr>
-            </a:lnRef>
-            <a:fillRef idx="1">
-              <a:schemeClr val="accent1"/>
-            </a:fillRef>
-            <a:effectRef idx="0">
-              <a:schemeClr val="accent1"/>
-            </a:effectRef>
-            <a:fontRef idx="minor">
-              <a:schemeClr val="lt1"/>
-            </a:fontRef>
-          </p:style>
-          <p:txBody>
-            <a:bodyPr rtlCol="0" anchor="ctr"/>
-            <a:lstStyle/>
-            <a:p>
-              <a:pPr algn="ctr"/>
-              <a:endParaRPr lang="en-US"/>
-            </a:p>
-          </p:txBody>
-        </p:sp>
-        <p:sp>
-          <p:nvSpPr>
-            <p:cNvPr id="58" name="Rectangle 57">
-              <a:extLst>
-                <a:ext uri="{FF2B5EF4-FFF2-40B4-BE49-F238E27FC236}">
-                  <a16:creationId xmlns:a16="http://schemas.microsoft.com/office/drawing/2014/main" id="{CE1ADF4D-07F0-41FA-BDBA-1E574D1D3181}"/>
-                </a:ext>
-              </a:extLst>
-            </p:cNvPr>
-            <p:cNvSpPr/>
-            <p:nvPr/>
-          </p:nvSpPr>
-          <p:spPr>
-            <a:xfrm>
-              <a:off x="8238908" y="905068"/>
-              <a:ext cx="2572008" cy="4674637"/>
-            </a:xfrm>
-            <a:prstGeom prst="rect">
-              <a:avLst/>
-            </a:prstGeom>
-            <a:noFill/>
-            <a:ln>
-              <a:prstDash val="dash"/>
-            </a:ln>
-          </p:spPr>
-          <p:style>
-            <a:lnRef idx="2">
-              <a:schemeClr val="accent1">
-                <a:shade val="50000"/>
-              </a:schemeClr>
-            </a:lnRef>
-            <a:fillRef idx="1">
-              <a:schemeClr val="accent1"/>
-            </a:fillRef>
-            <a:effectRef idx="0">
-              <a:schemeClr val="accent1"/>
-            </a:effectRef>
-            <a:fontRef idx="minor">
-              <a:schemeClr val="lt1"/>
-            </a:fontRef>
-          </p:style>
-          <p:txBody>
-            <a:bodyPr rtlCol="0" anchor="ctr"/>
-            <a:lstStyle/>
-            <a:p>
-              <a:pPr algn="ctr"/>
-              <a:endParaRPr lang="en-US"/>
-            </a:p>
-          </p:txBody>
-        </p:sp>
-        <p:sp>
-          <p:nvSpPr>
-            <p:cNvPr id="60" name="Rectangle: Rounded Corners 59">
-              <a:extLst>
-                <a:ext uri="{FF2B5EF4-FFF2-40B4-BE49-F238E27FC236}">
-                  <a16:creationId xmlns:a16="http://schemas.microsoft.com/office/drawing/2014/main" id="{639BFD10-6B78-4739-9FA6-016C81C60011}"/>
-                </a:ext>
-              </a:extLst>
-            </p:cNvPr>
-            <p:cNvSpPr/>
-            <p:nvPr/>
-          </p:nvSpPr>
-          <p:spPr>
-            <a:xfrm>
-              <a:off x="3828531" y="5645017"/>
-              <a:ext cx="4926694" cy="503853"/>
-            </a:xfrm>
-            <a:prstGeom prst="roundRect">
-              <a:avLst/>
-            </a:prstGeom>
-            <a:noFill/>
-          </p:spPr>
-          <p:style>
-            <a:lnRef idx="2">
-              <a:schemeClr val="accent1">
-                <a:shade val="50000"/>
-              </a:schemeClr>
-            </a:lnRef>
-            <a:fillRef idx="1">
-              <a:schemeClr val="accent1"/>
-            </a:fillRef>
-            <a:effectRef idx="0">
-              <a:schemeClr val="accent1"/>
-            </a:effectRef>
-            <a:fontRef idx="minor">
-              <a:schemeClr val="lt1"/>
-            </a:fontRef>
-          </p:style>
-          <p:txBody>
-            <a:bodyPr rtlCol="0" anchor="ctr"/>
-            <a:lstStyle/>
-            <a:p>
-              <a:pPr algn="ctr"/>
-              <a:r>
-                <a:rPr lang="en-US" altLang="zh-CN" dirty="0">
-                  <a:solidFill>
-                    <a:schemeClr val="tx1"/>
-                  </a:solidFill>
-                </a:rPr>
-                <a:t>Both attribute and spatial related questions</a:t>
-              </a:r>
-              <a:endParaRPr lang="en-US" dirty="0">
-                <a:solidFill>
-                  <a:schemeClr val="tx1"/>
-                </a:solidFill>
-              </a:endParaRPr>
-            </a:p>
-          </p:txBody>
-        </p:sp>
-        <p:sp>
-          <p:nvSpPr>
-            <p:cNvPr id="62" name="Rectangle 61">
-              <a:extLst>
-                <a:ext uri="{FF2B5EF4-FFF2-40B4-BE49-F238E27FC236}">
-                  <a16:creationId xmlns:a16="http://schemas.microsoft.com/office/drawing/2014/main" id="{99763728-39D9-47D5-B48E-BDDEF1342124}"/>
-                </a:ext>
-              </a:extLst>
-            </p:cNvPr>
-            <p:cNvSpPr/>
-            <p:nvPr/>
-          </p:nvSpPr>
-          <p:spPr>
-            <a:xfrm>
-              <a:off x="1586210" y="709131"/>
-              <a:ext cx="9321276" cy="5505058"/>
-            </a:xfrm>
-            <a:prstGeom prst="rect">
-              <a:avLst/>
-            </a:prstGeom>
-            <a:noFill/>
-            <a:ln>
-              <a:prstDash val="solid"/>
-            </a:ln>
-          </p:spPr>
-          <p:style>
-            <a:lnRef idx="2">
-              <a:schemeClr val="accent1">
-                <a:shade val="50000"/>
-              </a:schemeClr>
-            </a:lnRef>
-            <a:fillRef idx="1">
-              <a:schemeClr val="accent1"/>
-            </a:fillRef>
-            <a:effectRef idx="0">
-              <a:schemeClr val="accent1"/>
-            </a:effectRef>
-            <a:fontRef idx="minor">
-              <a:schemeClr val="lt1"/>
-            </a:fontRef>
-          </p:style>
-          <p:txBody>
-            <a:bodyPr rtlCol="0" anchor="ctr"/>
-            <a:lstStyle/>
-            <a:p>
-              <a:pPr algn="ctr"/>
-              <a:endParaRPr lang="en-US"/>
             </a:p>
           </p:txBody>
         </p:sp>

</xml_diff>